<commit_message>
update sdk overview schematic
merge central/developer repositories to module repositories
</commit_message>
<xml_diff>
--- a/overview/images/sdk_overview.pptx
+++ b/overview/images/sdk_overview.pptx
@@ -134,7 +134,7 @@
           <p:cNvPr id="2" name="Title 1">
             <a:extLst>
               <a:ext uri="{FF2B5EF4-FFF2-40B4-BE49-F238E27FC236}">
-                <a16:creationId xmlns:a16="http://schemas.microsoft.com/office/drawing/2014/main" xmlns="" id="{4243E3D0-5767-407F-872C-2BAB208E45C9}"/>
+                <a16:creationId xmlns="" xmlns:a16="http://schemas.microsoft.com/office/drawing/2014/main" id="{4243E3D0-5767-407F-872C-2BAB208E45C9}"/>
               </a:ext>
             </a:extLst>
           </p:cNvPr>
@@ -171,7 +171,7 @@
           <p:cNvPr id="3" name="Subtitle 2">
             <a:extLst>
               <a:ext uri="{FF2B5EF4-FFF2-40B4-BE49-F238E27FC236}">
-                <a16:creationId xmlns:a16="http://schemas.microsoft.com/office/drawing/2014/main" xmlns="" id="{B5C0D0C4-6FFE-40AB-AE8E-74B8A9323106}"/>
+                <a16:creationId xmlns="" xmlns:a16="http://schemas.microsoft.com/office/drawing/2014/main" id="{B5C0D0C4-6FFE-40AB-AE8E-74B8A9323106}"/>
               </a:ext>
             </a:extLst>
           </p:cNvPr>
@@ -241,7 +241,7 @@
           <p:cNvPr id="4" name="Date Placeholder 3">
             <a:extLst>
               <a:ext uri="{FF2B5EF4-FFF2-40B4-BE49-F238E27FC236}">
-                <a16:creationId xmlns:a16="http://schemas.microsoft.com/office/drawing/2014/main" xmlns="" id="{57FF27FE-F48A-41D9-AF18-CEC519A88593}"/>
+                <a16:creationId xmlns="" xmlns:a16="http://schemas.microsoft.com/office/drawing/2014/main" id="{57FF27FE-F48A-41D9-AF18-CEC519A88593}"/>
               </a:ext>
             </a:extLst>
           </p:cNvPr>
@@ -259,7 +259,7 @@
           <a:p>
             <a:fld id="{A3AE657A-D284-404D-960B-6B1864A84D1B}" type="datetimeFigureOut">
               <a:rPr lang="en-US" smtClean="0"/>
-              <a:t>3/28/2022</a:t>
+              <a:t>4/7/2022</a:t>
             </a:fld>
             <a:endParaRPr lang="en-US"/>
           </a:p>
@@ -270,7 +270,7 @@
           <p:cNvPr id="5" name="Footer Placeholder 4">
             <a:extLst>
               <a:ext uri="{FF2B5EF4-FFF2-40B4-BE49-F238E27FC236}">
-                <a16:creationId xmlns:a16="http://schemas.microsoft.com/office/drawing/2014/main" xmlns="" id="{79874C1E-7A1F-44C5-9BE3-8AACC708AF2B}"/>
+                <a16:creationId xmlns="" xmlns:a16="http://schemas.microsoft.com/office/drawing/2014/main" id="{79874C1E-7A1F-44C5-9BE3-8AACC708AF2B}"/>
               </a:ext>
             </a:extLst>
           </p:cNvPr>
@@ -295,7 +295,7 @@
           <p:cNvPr id="6" name="Slide Number Placeholder 5">
             <a:extLst>
               <a:ext uri="{FF2B5EF4-FFF2-40B4-BE49-F238E27FC236}">
-                <a16:creationId xmlns:a16="http://schemas.microsoft.com/office/drawing/2014/main" xmlns="" id="{0E5D5769-2CFE-4279-8005-3A358A0C9F7C}"/>
+                <a16:creationId xmlns="" xmlns:a16="http://schemas.microsoft.com/office/drawing/2014/main" id="{0E5D5769-2CFE-4279-8005-3A358A0C9F7C}"/>
               </a:ext>
             </a:extLst>
           </p:cNvPr>
@@ -354,7 +354,7 @@
           <p:cNvPr id="2" name="Title 1">
             <a:extLst>
               <a:ext uri="{FF2B5EF4-FFF2-40B4-BE49-F238E27FC236}">
-                <a16:creationId xmlns:a16="http://schemas.microsoft.com/office/drawing/2014/main" xmlns="" id="{E493B8E1-AB84-4A19-99A8-8FFDBBA42EEC}"/>
+                <a16:creationId xmlns="" xmlns:a16="http://schemas.microsoft.com/office/drawing/2014/main" id="{E493B8E1-AB84-4A19-99A8-8FFDBBA42EEC}"/>
               </a:ext>
             </a:extLst>
           </p:cNvPr>
@@ -382,7 +382,7 @@
           <p:cNvPr id="3" name="Vertical Text Placeholder 2">
             <a:extLst>
               <a:ext uri="{FF2B5EF4-FFF2-40B4-BE49-F238E27FC236}">
-                <a16:creationId xmlns:a16="http://schemas.microsoft.com/office/drawing/2014/main" xmlns="" id="{504EE673-0442-44CD-AD99-883EA8042F6C}"/>
+                <a16:creationId xmlns="" xmlns:a16="http://schemas.microsoft.com/office/drawing/2014/main" id="{504EE673-0442-44CD-AD99-883EA8042F6C}"/>
               </a:ext>
             </a:extLst>
           </p:cNvPr>
@@ -439,7 +439,7 @@
           <p:cNvPr id="4" name="Date Placeholder 3">
             <a:extLst>
               <a:ext uri="{FF2B5EF4-FFF2-40B4-BE49-F238E27FC236}">
-                <a16:creationId xmlns:a16="http://schemas.microsoft.com/office/drawing/2014/main" xmlns="" id="{BD4D62BC-979E-414F-ACA2-719E3126E0D3}"/>
+                <a16:creationId xmlns="" xmlns:a16="http://schemas.microsoft.com/office/drawing/2014/main" id="{BD4D62BC-979E-414F-ACA2-719E3126E0D3}"/>
               </a:ext>
             </a:extLst>
           </p:cNvPr>
@@ -457,7 +457,7 @@
           <a:p>
             <a:fld id="{A3AE657A-D284-404D-960B-6B1864A84D1B}" type="datetimeFigureOut">
               <a:rPr lang="en-US" smtClean="0"/>
-              <a:t>3/28/2022</a:t>
+              <a:t>4/7/2022</a:t>
             </a:fld>
             <a:endParaRPr lang="en-US"/>
           </a:p>
@@ -468,7 +468,7 @@
           <p:cNvPr id="5" name="Footer Placeholder 4">
             <a:extLst>
               <a:ext uri="{FF2B5EF4-FFF2-40B4-BE49-F238E27FC236}">
-                <a16:creationId xmlns:a16="http://schemas.microsoft.com/office/drawing/2014/main" xmlns="" id="{12648AE1-E942-4187-A24B-744428AD156E}"/>
+                <a16:creationId xmlns="" xmlns:a16="http://schemas.microsoft.com/office/drawing/2014/main" id="{12648AE1-E942-4187-A24B-744428AD156E}"/>
               </a:ext>
             </a:extLst>
           </p:cNvPr>
@@ -493,7 +493,7 @@
           <p:cNvPr id="6" name="Slide Number Placeholder 5">
             <a:extLst>
               <a:ext uri="{FF2B5EF4-FFF2-40B4-BE49-F238E27FC236}">
-                <a16:creationId xmlns:a16="http://schemas.microsoft.com/office/drawing/2014/main" xmlns="" id="{AAD573CE-9206-4A7C-899B-1B52C566D467}"/>
+                <a16:creationId xmlns="" xmlns:a16="http://schemas.microsoft.com/office/drawing/2014/main" id="{AAD573CE-9206-4A7C-899B-1B52C566D467}"/>
               </a:ext>
             </a:extLst>
           </p:cNvPr>
@@ -552,7 +552,7 @@
           <p:cNvPr id="2" name="Vertical Title 1">
             <a:extLst>
               <a:ext uri="{FF2B5EF4-FFF2-40B4-BE49-F238E27FC236}">
-                <a16:creationId xmlns:a16="http://schemas.microsoft.com/office/drawing/2014/main" xmlns="" id="{48AAB1A3-8764-420F-AD44-A386ECB4FCFB}"/>
+                <a16:creationId xmlns="" xmlns:a16="http://schemas.microsoft.com/office/drawing/2014/main" id="{48AAB1A3-8764-420F-AD44-A386ECB4FCFB}"/>
               </a:ext>
             </a:extLst>
           </p:cNvPr>
@@ -585,7 +585,7 @@
           <p:cNvPr id="3" name="Vertical Text Placeholder 2">
             <a:extLst>
               <a:ext uri="{FF2B5EF4-FFF2-40B4-BE49-F238E27FC236}">
-                <a16:creationId xmlns:a16="http://schemas.microsoft.com/office/drawing/2014/main" xmlns="" id="{FF710454-AC41-4FDA-8919-231447E90BA2}"/>
+                <a16:creationId xmlns="" xmlns:a16="http://schemas.microsoft.com/office/drawing/2014/main" id="{FF710454-AC41-4FDA-8919-231447E90BA2}"/>
               </a:ext>
             </a:extLst>
           </p:cNvPr>
@@ -647,7 +647,7 @@
           <p:cNvPr id="4" name="Date Placeholder 3">
             <a:extLst>
               <a:ext uri="{FF2B5EF4-FFF2-40B4-BE49-F238E27FC236}">
-                <a16:creationId xmlns:a16="http://schemas.microsoft.com/office/drawing/2014/main" xmlns="" id="{45DC499D-E247-4929-9A1C-407F23EA021F}"/>
+                <a16:creationId xmlns="" xmlns:a16="http://schemas.microsoft.com/office/drawing/2014/main" id="{45DC499D-E247-4929-9A1C-407F23EA021F}"/>
               </a:ext>
             </a:extLst>
           </p:cNvPr>
@@ -665,7 +665,7 @@
           <a:p>
             <a:fld id="{A3AE657A-D284-404D-960B-6B1864A84D1B}" type="datetimeFigureOut">
               <a:rPr lang="en-US" smtClean="0"/>
-              <a:t>3/28/2022</a:t>
+              <a:t>4/7/2022</a:t>
             </a:fld>
             <a:endParaRPr lang="en-US"/>
           </a:p>
@@ -676,7 +676,7 @@
           <p:cNvPr id="5" name="Footer Placeholder 4">
             <a:extLst>
               <a:ext uri="{FF2B5EF4-FFF2-40B4-BE49-F238E27FC236}">
-                <a16:creationId xmlns:a16="http://schemas.microsoft.com/office/drawing/2014/main" xmlns="" id="{4B3E01FA-FBBE-4A21-A2AC-EBEAABA022E2}"/>
+                <a16:creationId xmlns="" xmlns:a16="http://schemas.microsoft.com/office/drawing/2014/main" id="{4B3E01FA-FBBE-4A21-A2AC-EBEAABA022E2}"/>
               </a:ext>
             </a:extLst>
           </p:cNvPr>
@@ -701,7 +701,7 @@
           <p:cNvPr id="6" name="Slide Number Placeholder 5">
             <a:extLst>
               <a:ext uri="{FF2B5EF4-FFF2-40B4-BE49-F238E27FC236}">
-                <a16:creationId xmlns:a16="http://schemas.microsoft.com/office/drawing/2014/main" xmlns="" id="{EA7DE12E-2AF2-48E0-B454-6D04AFB32A85}"/>
+                <a16:creationId xmlns="" xmlns:a16="http://schemas.microsoft.com/office/drawing/2014/main" id="{EA7DE12E-2AF2-48E0-B454-6D04AFB32A85}"/>
               </a:ext>
             </a:extLst>
           </p:cNvPr>
@@ -760,7 +760,7 @@
           <p:cNvPr id="2" name="Title 1">
             <a:extLst>
               <a:ext uri="{FF2B5EF4-FFF2-40B4-BE49-F238E27FC236}">
-                <a16:creationId xmlns:a16="http://schemas.microsoft.com/office/drawing/2014/main" xmlns="" id="{0E1B28FB-8487-4D52-88BB-8F326D508605}"/>
+                <a16:creationId xmlns="" xmlns:a16="http://schemas.microsoft.com/office/drawing/2014/main" id="{0E1B28FB-8487-4D52-88BB-8F326D508605}"/>
               </a:ext>
             </a:extLst>
           </p:cNvPr>
@@ -788,7 +788,7 @@
           <p:cNvPr id="3" name="Content Placeholder 2">
             <a:extLst>
               <a:ext uri="{FF2B5EF4-FFF2-40B4-BE49-F238E27FC236}">
-                <a16:creationId xmlns:a16="http://schemas.microsoft.com/office/drawing/2014/main" xmlns="" id="{B5E60C55-2213-4A0A-8D34-6DC18B740A4D}"/>
+                <a16:creationId xmlns="" xmlns:a16="http://schemas.microsoft.com/office/drawing/2014/main" id="{B5E60C55-2213-4A0A-8D34-6DC18B740A4D}"/>
               </a:ext>
             </a:extLst>
           </p:cNvPr>
@@ -845,7 +845,7 @@
           <p:cNvPr id="4" name="Date Placeholder 3">
             <a:extLst>
               <a:ext uri="{FF2B5EF4-FFF2-40B4-BE49-F238E27FC236}">
-                <a16:creationId xmlns:a16="http://schemas.microsoft.com/office/drawing/2014/main" xmlns="" id="{114A91A5-54C2-41A6-AD1F-295D574EEF1F}"/>
+                <a16:creationId xmlns="" xmlns:a16="http://schemas.microsoft.com/office/drawing/2014/main" id="{114A91A5-54C2-41A6-AD1F-295D574EEF1F}"/>
               </a:ext>
             </a:extLst>
           </p:cNvPr>
@@ -863,7 +863,7 @@
           <a:p>
             <a:fld id="{A3AE657A-D284-404D-960B-6B1864A84D1B}" type="datetimeFigureOut">
               <a:rPr lang="en-US" smtClean="0"/>
-              <a:t>3/28/2022</a:t>
+              <a:t>4/7/2022</a:t>
             </a:fld>
             <a:endParaRPr lang="en-US"/>
           </a:p>
@@ -874,7 +874,7 @@
           <p:cNvPr id="5" name="Footer Placeholder 4">
             <a:extLst>
               <a:ext uri="{FF2B5EF4-FFF2-40B4-BE49-F238E27FC236}">
-                <a16:creationId xmlns:a16="http://schemas.microsoft.com/office/drawing/2014/main" xmlns="" id="{E1A26EFA-E991-43E7-9C78-B4BB6ECE4A41}"/>
+                <a16:creationId xmlns="" xmlns:a16="http://schemas.microsoft.com/office/drawing/2014/main" id="{E1A26EFA-E991-43E7-9C78-B4BB6ECE4A41}"/>
               </a:ext>
             </a:extLst>
           </p:cNvPr>
@@ -899,7 +899,7 @@
           <p:cNvPr id="6" name="Slide Number Placeholder 5">
             <a:extLst>
               <a:ext uri="{FF2B5EF4-FFF2-40B4-BE49-F238E27FC236}">
-                <a16:creationId xmlns:a16="http://schemas.microsoft.com/office/drawing/2014/main" xmlns="" id="{3CD36FE9-589F-4A0F-AAE5-46A53382A676}"/>
+                <a16:creationId xmlns="" xmlns:a16="http://schemas.microsoft.com/office/drawing/2014/main" id="{3CD36FE9-589F-4A0F-AAE5-46A53382A676}"/>
               </a:ext>
             </a:extLst>
           </p:cNvPr>
@@ -958,7 +958,7 @@
           <p:cNvPr id="2" name="Title 1">
             <a:extLst>
               <a:ext uri="{FF2B5EF4-FFF2-40B4-BE49-F238E27FC236}">
-                <a16:creationId xmlns:a16="http://schemas.microsoft.com/office/drawing/2014/main" xmlns="" id="{0627631A-428C-4235-B3B3-5CF0755771CA}"/>
+                <a16:creationId xmlns="" xmlns:a16="http://schemas.microsoft.com/office/drawing/2014/main" id="{0627631A-428C-4235-B3B3-5CF0755771CA}"/>
               </a:ext>
             </a:extLst>
           </p:cNvPr>
@@ -995,7 +995,7 @@
           <p:cNvPr id="3" name="Text Placeholder 2">
             <a:extLst>
               <a:ext uri="{FF2B5EF4-FFF2-40B4-BE49-F238E27FC236}">
-                <a16:creationId xmlns:a16="http://schemas.microsoft.com/office/drawing/2014/main" xmlns="" id="{70C4FE9A-A32C-4B26-BC26-8394C7C01A2B}"/>
+                <a16:creationId xmlns="" xmlns:a16="http://schemas.microsoft.com/office/drawing/2014/main" id="{70C4FE9A-A32C-4B26-BC26-8394C7C01A2B}"/>
               </a:ext>
             </a:extLst>
           </p:cNvPr>
@@ -1120,7 +1120,7 @@
           <p:cNvPr id="4" name="Date Placeholder 3">
             <a:extLst>
               <a:ext uri="{FF2B5EF4-FFF2-40B4-BE49-F238E27FC236}">
-                <a16:creationId xmlns:a16="http://schemas.microsoft.com/office/drawing/2014/main" xmlns="" id="{51DC7A1A-32CE-43D4-A34D-7D167EBE1B03}"/>
+                <a16:creationId xmlns="" xmlns:a16="http://schemas.microsoft.com/office/drawing/2014/main" id="{51DC7A1A-32CE-43D4-A34D-7D167EBE1B03}"/>
               </a:ext>
             </a:extLst>
           </p:cNvPr>
@@ -1138,7 +1138,7 @@
           <a:p>
             <a:fld id="{A3AE657A-D284-404D-960B-6B1864A84D1B}" type="datetimeFigureOut">
               <a:rPr lang="en-US" smtClean="0"/>
-              <a:t>3/28/2022</a:t>
+              <a:t>4/7/2022</a:t>
             </a:fld>
             <a:endParaRPr lang="en-US"/>
           </a:p>
@@ -1149,7 +1149,7 @@
           <p:cNvPr id="5" name="Footer Placeholder 4">
             <a:extLst>
               <a:ext uri="{FF2B5EF4-FFF2-40B4-BE49-F238E27FC236}">
-                <a16:creationId xmlns:a16="http://schemas.microsoft.com/office/drawing/2014/main" xmlns="" id="{BA62EE10-D047-4BD9-A3F6-DD5EBA209CA1}"/>
+                <a16:creationId xmlns="" xmlns:a16="http://schemas.microsoft.com/office/drawing/2014/main" id="{BA62EE10-D047-4BD9-A3F6-DD5EBA209CA1}"/>
               </a:ext>
             </a:extLst>
           </p:cNvPr>
@@ -1174,7 +1174,7 @@
           <p:cNvPr id="6" name="Slide Number Placeholder 5">
             <a:extLst>
               <a:ext uri="{FF2B5EF4-FFF2-40B4-BE49-F238E27FC236}">
-                <a16:creationId xmlns:a16="http://schemas.microsoft.com/office/drawing/2014/main" xmlns="" id="{8FCB72E2-5F2D-4C3C-A573-D36B3498BA7A}"/>
+                <a16:creationId xmlns="" xmlns:a16="http://schemas.microsoft.com/office/drawing/2014/main" id="{8FCB72E2-5F2D-4C3C-A573-D36B3498BA7A}"/>
               </a:ext>
             </a:extLst>
           </p:cNvPr>
@@ -1233,7 +1233,7 @@
           <p:cNvPr id="2" name="Title 1">
             <a:extLst>
               <a:ext uri="{FF2B5EF4-FFF2-40B4-BE49-F238E27FC236}">
-                <a16:creationId xmlns:a16="http://schemas.microsoft.com/office/drawing/2014/main" xmlns="" id="{61CB242F-90DA-4932-9B60-1E44AEF49484}"/>
+                <a16:creationId xmlns="" xmlns:a16="http://schemas.microsoft.com/office/drawing/2014/main" id="{61CB242F-90DA-4932-9B60-1E44AEF49484}"/>
               </a:ext>
             </a:extLst>
           </p:cNvPr>
@@ -1261,7 +1261,7 @@
           <p:cNvPr id="3" name="Content Placeholder 2">
             <a:extLst>
               <a:ext uri="{FF2B5EF4-FFF2-40B4-BE49-F238E27FC236}">
-                <a16:creationId xmlns:a16="http://schemas.microsoft.com/office/drawing/2014/main" xmlns="" id="{788E95E5-B64D-46CE-ACF2-6A351D5FB94D}"/>
+                <a16:creationId xmlns="" xmlns:a16="http://schemas.microsoft.com/office/drawing/2014/main" id="{788E95E5-B64D-46CE-ACF2-6A351D5FB94D}"/>
               </a:ext>
             </a:extLst>
           </p:cNvPr>
@@ -1323,7 +1323,7 @@
           <p:cNvPr id="4" name="Content Placeholder 3">
             <a:extLst>
               <a:ext uri="{FF2B5EF4-FFF2-40B4-BE49-F238E27FC236}">
-                <a16:creationId xmlns:a16="http://schemas.microsoft.com/office/drawing/2014/main" xmlns="" id="{59BAA6EB-4BED-4357-983D-EA104F4B060A}"/>
+                <a16:creationId xmlns="" xmlns:a16="http://schemas.microsoft.com/office/drawing/2014/main" id="{59BAA6EB-4BED-4357-983D-EA104F4B060A}"/>
               </a:ext>
             </a:extLst>
           </p:cNvPr>
@@ -1385,7 +1385,7 @@
           <p:cNvPr id="5" name="Date Placeholder 4">
             <a:extLst>
               <a:ext uri="{FF2B5EF4-FFF2-40B4-BE49-F238E27FC236}">
-                <a16:creationId xmlns:a16="http://schemas.microsoft.com/office/drawing/2014/main" xmlns="" id="{5A25FC22-7C76-457B-B4AA-215CA835C3E1}"/>
+                <a16:creationId xmlns="" xmlns:a16="http://schemas.microsoft.com/office/drawing/2014/main" id="{5A25FC22-7C76-457B-B4AA-215CA835C3E1}"/>
               </a:ext>
             </a:extLst>
           </p:cNvPr>
@@ -1403,7 +1403,7 @@
           <a:p>
             <a:fld id="{A3AE657A-D284-404D-960B-6B1864A84D1B}" type="datetimeFigureOut">
               <a:rPr lang="en-US" smtClean="0"/>
-              <a:t>3/28/2022</a:t>
+              <a:t>4/7/2022</a:t>
             </a:fld>
             <a:endParaRPr lang="en-US"/>
           </a:p>
@@ -1414,7 +1414,7 @@
           <p:cNvPr id="6" name="Footer Placeholder 5">
             <a:extLst>
               <a:ext uri="{FF2B5EF4-FFF2-40B4-BE49-F238E27FC236}">
-                <a16:creationId xmlns:a16="http://schemas.microsoft.com/office/drawing/2014/main" xmlns="" id="{F8AD7C2F-FD59-46E5-85F6-10CBA1C0F450}"/>
+                <a16:creationId xmlns="" xmlns:a16="http://schemas.microsoft.com/office/drawing/2014/main" id="{F8AD7C2F-FD59-46E5-85F6-10CBA1C0F450}"/>
               </a:ext>
             </a:extLst>
           </p:cNvPr>
@@ -1439,7 +1439,7 @@
           <p:cNvPr id="7" name="Slide Number Placeholder 6">
             <a:extLst>
               <a:ext uri="{FF2B5EF4-FFF2-40B4-BE49-F238E27FC236}">
-                <a16:creationId xmlns:a16="http://schemas.microsoft.com/office/drawing/2014/main" xmlns="" id="{98B3FFE0-2B60-4C11-A32E-1FCF8493AF62}"/>
+                <a16:creationId xmlns="" xmlns:a16="http://schemas.microsoft.com/office/drawing/2014/main" id="{98B3FFE0-2B60-4C11-A32E-1FCF8493AF62}"/>
               </a:ext>
             </a:extLst>
           </p:cNvPr>
@@ -1498,7 +1498,7 @@
           <p:cNvPr id="2" name="Title 1">
             <a:extLst>
               <a:ext uri="{FF2B5EF4-FFF2-40B4-BE49-F238E27FC236}">
-                <a16:creationId xmlns:a16="http://schemas.microsoft.com/office/drawing/2014/main" xmlns="" id="{1C78C062-392B-449C-B8CE-B5DE3D886F86}"/>
+                <a16:creationId xmlns="" xmlns:a16="http://schemas.microsoft.com/office/drawing/2014/main" id="{1C78C062-392B-449C-B8CE-B5DE3D886F86}"/>
               </a:ext>
             </a:extLst>
           </p:cNvPr>
@@ -1531,7 +1531,7 @@
           <p:cNvPr id="3" name="Text Placeholder 2">
             <a:extLst>
               <a:ext uri="{FF2B5EF4-FFF2-40B4-BE49-F238E27FC236}">
-                <a16:creationId xmlns:a16="http://schemas.microsoft.com/office/drawing/2014/main" xmlns="" id="{F6CD22DE-6688-42E5-983F-AB537BC15F61}"/>
+                <a16:creationId xmlns="" xmlns:a16="http://schemas.microsoft.com/office/drawing/2014/main" id="{F6CD22DE-6688-42E5-983F-AB537BC15F61}"/>
               </a:ext>
             </a:extLst>
           </p:cNvPr>
@@ -1602,7 +1602,7 @@
           <p:cNvPr id="4" name="Content Placeholder 3">
             <a:extLst>
               <a:ext uri="{FF2B5EF4-FFF2-40B4-BE49-F238E27FC236}">
-                <a16:creationId xmlns:a16="http://schemas.microsoft.com/office/drawing/2014/main" xmlns="" id="{EBE71AF3-41EE-4F51-8C21-BC7D3E327C8D}"/>
+                <a16:creationId xmlns="" xmlns:a16="http://schemas.microsoft.com/office/drawing/2014/main" id="{EBE71AF3-41EE-4F51-8C21-BC7D3E327C8D}"/>
               </a:ext>
             </a:extLst>
           </p:cNvPr>
@@ -1664,7 +1664,7 @@
           <p:cNvPr id="5" name="Text Placeholder 4">
             <a:extLst>
               <a:ext uri="{FF2B5EF4-FFF2-40B4-BE49-F238E27FC236}">
-                <a16:creationId xmlns:a16="http://schemas.microsoft.com/office/drawing/2014/main" xmlns="" id="{73B194B6-F36E-4B56-AE2D-FC9E3BE7932C}"/>
+                <a16:creationId xmlns="" xmlns:a16="http://schemas.microsoft.com/office/drawing/2014/main" id="{73B194B6-F36E-4B56-AE2D-FC9E3BE7932C}"/>
               </a:ext>
             </a:extLst>
           </p:cNvPr>
@@ -1735,7 +1735,7 @@
           <p:cNvPr id="6" name="Content Placeholder 5">
             <a:extLst>
               <a:ext uri="{FF2B5EF4-FFF2-40B4-BE49-F238E27FC236}">
-                <a16:creationId xmlns:a16="http://schemas.microsoft.com/office/drawing/2014/main" xmlns="" id="{B01EC941-0411-4396-BA23-9E4B19E149B4}"/>
+                <a16:creationId xmlns="" xmlns:a16="http://schemas.microsoft.com/office/drawing/2014/main" id="{B01EC941-0411-4396-BA23-9E4B19E149B4}"/>
               </a:ext>
             </a:extLst>
           </p:cNvPr>
@@ -1797,7 +1797,7 @@
           <p:cNvPr id="7" name="Date Placeholder 6">
             <a:extLst>
               <a:ext uri="{FF2B5EF4-FFF2-40B4-BE49-F238E27FC236}">
-                <a16:creationId xmlns:a16="http://schemas.microsoft.com/office/drawing/2014/main" xmlns="" id="{2E728EBB-506B-4F31-886B-80D8B3A550A6}"/>
+                <a16:creationId xmlns="" xmlns:a16="http://schemas.microsoft.com/office/drawing/2014/main" id="{2E728EBB-506B-4F31-886B-80D8B3A550A6}"/>
               </a:ext>
             </a:extLst>
           </p:cNvPr>
@@ -1815,7 +1815,7 @@
           <a:p>
             <a:fld id="{A3AE657A-D284-404D-960B-6B1864A84D1B}" type="datetimeFigureOut">
               <a:rPr lang="en-US" smtClean="0"/>
-              <a:t>3/28/2022</a:t>
+              <a:t>4/7/2022</a:t>
             </a:fld>
             <a:endParaRPr lang="en-US"/>
           </a:p>
@@ -1826,7 +1826,7 @@
           <p:cNvPr id="8" name="Footer Placeholder 7">
             <a:extLst>
               <a:ext uri="{FF2B5EF4-FFF2-40B4-BE49-F238E27FC236}">
-                <a16:creationId xmlns:a16="http://schemas.microsoft.com/office/drawing/2014/main" xmlns="" id="{B44AF1B1-CDB9-4627-9337-59449F01AC7A}"/>
+                <a16:creationId xmlns="" xmlns:a16="http://schemas.microsoft.com/office/drawing/2014/main" id="{B44AF1B1-CDB9-4627-9337-59449F01AC7A}"/>
               </a:ext>
             </a:extLst>
           </p:cNvPr>
@@ -1851,7 +1851,7 @@
           <p:cNvPr id="9" name="Slide Number Placeholder 8">
             <a:extLst>
               <a:ext uri="{FF2B5EF4-FFF2-40B4-BE49-F238E27FC236}">
-                <a16:creationId xmlns:a16="http://schemas.microsoft.com/office/drawing/2014/main" xmlns="" id="{9B0C9E1E-6E34-454C-9223-EA62E44F00AD}"/>
+                <a16:creationId xmlns="" xmlns:a16="http://schemas.microsoft.com/office/drawing/2014/main" id="{9B0C9E1E-6E34-454C-9223-EA62E44F00AD}"/>
               </a:ext>
             </a:extLst>
           </p:cNvPr>
@@ -1910,7 +1910,7 @@
           <p:cNvPr id="2" name="Title 1">
             <a:extLst>
               <a:ext uri="{FF2B5EF4-FFF2-40B4-BE49-F238E27FC236}">
-                <a16:creationId xmlns:a16="http://schemas.microsoft.com/office/drawing/2014/main" xmlns="" id="{8DA7F72A-1F12-41E4-95DD-89CB88B4CB47}"/>
+                <a16:creationId xmlns="" xmlns:a16="http://schemas.microsoft.com/office/drawing/2014/main" id="{8DA7F72A-1F12-41E4-95DD-89CB88B4CB47}"/>
               </a:ext>
             </a:extLst>
           </p:cNvPr>
@@ -1938,7 +1938,7 @@
           <p:cNvPr id="3" name="Date Placeholder 2">
             <a:extLst>
               <a:ext uri="{FF2B5EF4-FFF2-40B4-BE49-F238E27FC236}">
-                <a16:creationId xmlns:a16="http://schemas.microsoft.com/office/drawing/2014/main" xmlns="" id="{E1230E12-6076-49CB-9E6E-C5C642FE4793}"/>
+                <a16:creationId xmlns="" xmlns:a16="http://schemas.microsoft.com/office/drawing/2014/main" id="{E1230E12-6076-49CB-9E6E-C5C642FE4793}"/>
               </a:ext>
             </a:extLst>
           </p:cNvPr>
@@ -1956,7 +1956,7 @@
           <a:p>
             <a:fld id="{A3AE657A-D284-404D-960B-6B1864A84D1B}" type="datetimeFigureOut">
               <a:rPr lang="en-US" smtClean="0"/>
-              <a:t>3/28/2022</a:t>
+              <a:t>4/7/2022</a:t>
             </a:fld>
             <a:endParaRPr lang="en-US"/>
           </a:p>
@@ -1967,7 +1967,7 @@
           <p:cNvPr id="4" name="Footer Placeholder 3">
             <a:extLst>
               <a:ext uri="{FF2B5EF4-FFF2-40B4-BE49-F238E27FC236}">
-                <a16:creationId xmlns:a16="http://schemas.microsoft.com/office/drawing/2014/main" xmlns="" id="{09513BE8-E2C4-4578-AD28-62A82C5C8748}"/>
+                <a16:creationId xmlns="" xmlns:a16="http://schemas.microsoft.com/office/drawing/2014/main" id="{09513BE8-E2C4-4578-AD28-62A82C5C8748}"/>
               </a:ext>
             </a:extLst>
           </p:cNvPr>
@@ -1992,7 +1992,7 @@
           <p:cNvPr id="5" name="Slide Number Placeholder 4">
             <a:extLst>
               <a:ext uri="{FF2B5EF4-FFF2-40B4-BE49-F238E27FC236}">
-                <a16:creationId xmlns:a16="http://schemas.microsoft.com/office/drawing/2014/main" xmlns="" id="{488EB3D3-86DA-4F31-BDBB-695ABC949AE5}"/>
+                <a16:creationId xmlns="" xmlns:a16="http://schemas.microsoft.com/office/drawing/2014/main" id="{488EB3D3-86DA-4F31-BDBB-695ABC949AE5}"/>
               </a:ext>
             </a:extLst>
           </p:cNvPr>
@@ -2051,7 +2051,7 @@
           <p:cNvPr id="2" name="Date Placeholder 1">
             <a:extLst>
               <a:ext uri="{FF2B5EF4-FFF2-40B4-BE49-F238E27FC236}">
-                <a16:creationId xmlns:a16="http://schemas.microsoft.com/office/drawing/2014/main" xmlns="" id="{57F069B2-016A-4E27-86F1-362553CBFBF8}"/>
+                <a16:creationId xmlns="" xmlns:a16="http://schemas.microsoft.com/office/drawing/2014/main" id="{57F069B2-016A-4E27-86F1-362553CBFBF8}"/>
               </a:ext>
             </a:extLst>
           </p:cNvPr>
@@ -2069,7 +2069,7 @@
           <a:p>
             <a:fld id="{A3AE657A-D284-404D-960B-6B1864A84D1B}" type="datetimeFigureOut">
               <a:rPr lang="en-US" smtClean="0"/>
-              <a:t>3/28/2022</a:t>
+              <a:t>4/7/2022</a:t>
             </a:fld>
             <a:endParaRPr lang="en-US"/>
           </a:p>
@@ -2080,7 +2080,7 @@
           <p:cNvPr id="3" name="Footer Placeholder 2">
             <a:extLst>
               <a:ext uri="{FF2B5EF4-FFF2-40B4-BE49-F238E27FC236}">
-                <a16:creationId xmlns:a16="http://schemas.microsoft.com/office/drawing/2014/main" xmlns="" id="{791F90A9-3720-4BB0-A934-298DAE23A04B}"/>
+                <a16:creationId xmlns="" xmlns:a16="http://schemas.microsoft.com/office/drawing/2014/main" id="{791F90A9-3720-4BB0-A934-298DAE23A04B}"/>
               </a:ext>
             </a:extLst>
           </p:cNvPr>
@@ -2105,7 +2105,7 @@
           <p:cNvPr id="4" name="Slide Number Placeholder 3">
             <a:extLst>
               <a:ext uri="{FF2B5EF4-FFF2-40B4-BE49-F238E27FC236}">
-                <a16:creationId xmlns:a16="http://schemas.microsoft.com/office/drawing/2014/main" xmlns="" id="{664794EF-DBBD-482B-A780-21502550ABE7}"/>
+                <a16:creationId xmlns="" xmlns:a16="http://schemas.microsoft.com/office/drawing/2014/main" id="{664794EF-DBBD-482B-A780-21502550ABE7}"/>
               </a:ext>
             </a:extLst>
           </p:cNvPr>
@@ -2164,7 +2164,7 @@
           <p:cNvPr id="2" name="Title 1">
             <a:extLst>
               <a:ext uri="{FF2B5EF4-FFF2-40B4-BE49-F238E27FC236}">
-                <a16:creationId xmlns:a16="http://schemas.microsoft.com/office/drawing/2014/main" xmlns="" id="{6D0CC981-BC2A-4566-BA54-B1FACDCAF48D}"/>
+                <a16:creationId xmlns="" xmlns:a16="http://schemas.microsoft.com/office/drawing/2014/main" id="{6D0CC981-BC2A-4566-BA54-B1FACDCAF48D}"/>
               </a:ext>
             </a:extLst>
           </p:cNvPr>
@@ -2201,7 +2201,7 @@
           <p:cNvPr id="3" name="Content Placeholder 2">
             <a:extLst>
               <a:ext uri="{FF2B5EF4-FFF2-40B4-BE49-F238E27FC236}">
-                <a16:creationId xmlns:a16="http://schemas.microsoft.com/office/drawing/2014/main" xmlns="" id="{CF32CEED-D1F1-4801-84AD-CB77A51AB429}"/>
+                <a16:creationId xmlns="" xmlns:a16="http://schemas.microsoft.com/office/drawing/2014/main" id="{CF32CEED-D1F1-4801-84AD-CB77A51AB429}"/>
               </a:ext>
             </a:extLst>
           </p:cNvPr>
@@ -2291,7 +2291,7 @@
           <p:cNvPr id="4" name="Text Placeholder 3">
             <a:extLst>
               <a:ext uri="{FF2B5EF4-FFF2-40B4-BE49-F238E27FC236}">
-                <a16:creationId xmlns:a16="http://schemas.microsoft.com/office/drawing/2014/main" xmlns="" id="{81C6CE86-C87A-4620-91E1-94FBE4804063}"/>
+                <a16:creationId xmlns="" xmlns:a16="http://schemas.microsoft.com/office/drawing/2014/main" id="{81C6CE86-C87A-4620-91E1-94FBE4804063}"/>
               </a:ext>
             </a:extLst>
           </p:cNvPr>
@@ -2362,7 +2362,7 @@
           <p:cNvPr id="5" name="Date Placeholder 4">
             <a:extLst>
               <a:ext uri="{FF2B5EF4-FFF2-40B4-BE49-F238E27FC236}">
-                <a16:creationId xmlns:a16="http://schemas.microsoft.com/office/drawing/2014/main" xmlns="" id="{84A81CCF-6073-4981-805E-B970CA8EAB70}"/>
+                <a16:creationId xmlns="" xmlns:a16="http://schemas.microsoft.com/office/drawing/2014/main" id="{84A81CCF-6073-4981-805E-B970CA8EAB70}"/>
               </a:ext>
             </a:extLst>
           </p:cNvPr>
@@ -2380,7 +2380,7 @@
           <a:p>
             <a:fld id="{A3AE657A-D284-404D-960B-6B1864A84D1B}" type="datetimeFigureOut">
               <a:rPr lang="en-US" smtClean="0"/>
-              <a:t>3/28/2022</a:t>
+              <a:t>4/7/2022</a:t>
             </a:fld>
             <a:endParaRPr lang="en-US"/>
           </a:p>
@@ -2391,7 +2391,7 @@
           <p:cNvPr id="6" name="Footer Placeholder 5">
             <a:extLst>
               <a:ext uri="{FF2B5EF4-FFF2-40B4-BE49-F238E27FC236}">
-                <a16:creationId xmlns:a16="http://schemas.microsoft.com/office/drawing/2014/main" xmlns="" id="{FE1F0BBE-5758-4FEB-B74D-E83097EF1A0E}"/>
+                <a16:creationId xmlns="" xmlns:a16="http://schemas.microsoft.com/office/drawing/2014/main" id="{FE1F0BBE-5758-4FEB-B74D-E83097EF1A0E}"/>
               </a:ext>
             </a:extLst>
           </p:cNvPr>
@@ -2416,7 +2416,7 @@
           <p:cNvPr id="7" name="Slide Number Placeholder 6">
             <a:extLst>
               <a:ext uri="{FF2B5EF4-FFF2-40B4-BE49-F238E27FC236}">
-                <a16:creationId xmlns:a16="http://schemas.microsoft.com/office/drawing/2014/main" xmlns="" id="{2DD8899B-B015-4679-B980-75A6FE60E7C1}"/>
+                <a16:creationId xmlns="" xmlns:a16="http://schemas.microsoft.com/office/drawing/2014/main" id="{2DD8899B-B015-4679-B980-75A6FE60E7C1}"/>
               </a:ext>
             </a:extLst>
           </p:cNvPr>
@@ -2475,7 +2475,7 @@
           <p:cNvPr id="2" name="Title 1">
             <a:extLst>
               <a:ext uri="{FF2B5EF4-FFF2-40B4-BE49-F238E27FC236}">
-                <a16:creationId xmlns:a16="http://schemas.microsoft.com/office/drawing/2014/main" xmlns="" id="{8B4C2EBA-5FFF-4E97-9A88-E605A6524D13}"/>
+                <a16:creationId xmlns="" xmlns:a16="http://schemas.microsoft.com/office/drawing/2014/main" id="{8B4C2EBA-5FFF-4E97-9A88-E605A6524D13}"/>
               </a:ext>
             </a:extLst>
           </p:cNvPr>
@@ -2512,7 +2512,7 @@
           <p:cNvPr id="3" name="Picture Placeholder 2">
             <a:extLst>
               <a:ext uri="{FF2B5EF4-FFF2-40B4-BE49-F238E27FC236}">
-                <a16:creationId xmlns:a16="http://schemas.microsoft.com/office/drawing/2014/main" xmlns="" id="{4BEEE40D-DDC8-4194-95AE-3F8428D2A75E}"/>
+                <a16:creationId xmlns="" xmlns:a16="http://schemas.microsoft.com/office/drawing/2014/main" id="{4BEEE40D-DDC8-4194-95AE-3F8428D2A75E}"/>
               </a:ext>
             </a:extLst>
           </p:cNvPr>
@@ -2579,7 +2579,7 @@
           <p:cNvPr id="4" name="Text Placeholder 3">
             <a:extLst>
               <a:ext uri="{FF2B5EF4-FFF2-40B4-BE49-F238E27FC236}">
-                <a16:creationId xmlns:a16="http://schemas.microsoft.com/office/drawing/2014/main" xmlns="" id="{41A49CA5-9F13-48B1-AD08-99DB2DE25458}"/>
+                <a16:creationId xmlns="" xmlns:a16="http://schemas.microsoft.com/office/drawing/2014/main" id="{41A49CA5-9F13-48B1-AD08-99DB2DE25458}"/>
               </a:ext>
             </a:extLst>
           </p:cNvPr>
@@ -2650,7 +2650,7 @@
           <p:cNvPr id="5" name="Date Placeholder 4">
             <a:extLst>
               <a:ext uri="{FF2B5EF4-FFF2-40B4-BE49-F238E27FC236}">
-                <a16:creationId xmlns:a16="http://schemas.microsoft.com/office/drawing/2014/main" xmlns="" id="{17763D3E-C535-4B90-814D-77964803AC10}"/>
+                <a16:creationId xmlns="" xmlns:a16="http://schemas.microsoft.com/office/drawing/2014/main" id="{17763D3E-C535-4B90-814D-77964803AC10}"/>
               </a:ext>
             </a:extLst>
           </p:cNvPr>
@@ -2668,7 +2668,7 @@
           <a:p>
             <a:fld id="{A3AE657A-D284-404D-960B-6B1864A84D1B}" type="datetimeFigureOut">
               <a:rPr lang="en-US" smtClean="0"/>
-              <a:t>3/28/2022</a:t>
+              <a:t>4/7/2022</a:t>
             </a:fld>
             <a:endParaRPr lang="en-US"/>
           </a:p>
@@ -2679,7 +2679,7 @@
           <p:cNvPr id="6" name="Footer Placeholder 5">
             <a:extLst>
               <a:ext uri="{FF2B5EF4-FFF2-40B4-BE49-F238E27FC236}">
-                <a16:creationId xmlns:a16="http://schemas.microsoft.com/office/drawing/2014/main" xmlns="" id="{7E4472C7-A0B9-48B6-AECC-45F7EF14EFE4}"/>
+                <a16:creationId xmlns="" xmlns:a16="http://schemas.microsoft.com/office/drawing/2014/main" id="{7E4472C7-A0B9-48B6-AECC-45F7EF14EFE4}"/>
               </a:ext>
             </a:extLst>
           </p:cNvPr>
@@ -2704,7 +2704,7 @@
           <p:cNvPr id="7" name="Slide Number Placeholder 6">
             <a:extLst>
               <a:ext uri="{FF2B5EF4-FFF2-40B4-BE49-F238E27FC236}">
-                <a16:creationId xmlns:a16="http://schemas.microsoft.com/office/drawing/2014/main" xmlns="" id="{E9C83EB5-6CC3-45AD-A266-794B610EEE1C}"/>
+                <a16:creationId xmlns="" xmlns:a16="http://schemas.microsoft.com/office/drawing/2014/main" id="{E9C83EB5-6CC3-45AD-A266-794B610EEE1C}"/>
               </a:ext>
             </a:extLst>
           </p:cNvPr>
@@ -2768,7 +2768,7 @@
           <p:cNvPr id="2" name="Title Placeholder 1">
             <a:extLst>
               <a:ext uri="{FF2B5EF4-FFF2-40B4-BE49-F238E27FC236}">
-                <a16:creationId xmlns:a16="http://schemas.microsoft.com/office/drawing/2014/main" xmlns="" id="{FC07EE6F-80F7-498F-8FC8-766087863C96}"/>
+                <a16:creationId xmlns="" xmlns:a16="http://schemas.microsoft.com/office/drawing/2014/main" id="{FC07EE6F-80F7-498F-8FC8-766087863C96}"/>
               </a:ext>
             </a:extLst>
           </p:cNvPr>
@@ -2806,7 +2806,7 @@
           <p:cNvPr id="3" name="Text Placeholder 2">
             <a:extLst>
               <a:ext uri="{FF2B5EF4-FFF2-40B4-BE49-F238E27FC236}">
-                <a16:creationId xmlns:a16="http://schemas.microsoft.com/office/drawing/2014/main" xmlns="" id="{78F0F1D2-23C3-432E-BF86-FE9C26EB9A3E}"/>
+                <a16:creationId xmlns="" xmlns:a16="http://schemas.microsoft.com/office/drawing/2014/main" id="{78F0F1D2-23C3-432E-BF86-FE9C26EB9A3E}"/>
               </a:ext>
             </a:extLst>
           </p:cNvPr>
@@ -2873,7 +2873,7 @@
           <p:cNvPr id="4" name="Date Placeholder 3">
             <a:extLst>
               <a:ext uri="{FF2B5EF4-FFF2-40B4-BE49-F238E27FC236}">
-                <a16:creationId xmlns:a16="http://schemas.microsoft.com/office/drawing/2014/main" xmlns="" id="{45FBC486-1BCB-4B13-9054-B2C57F6EE911}"/>
+                <a16:creationId xmlns="" xmlns:a16="http://schemas.microsoft.com/office/drawing/2014/main" id="{45FBC486-1BCB-4B13-9054-B2C57F6EE911}"/>
               </a:ext>
             </a:extLst>
           </p:cNvPr>
@@ -2909,7 +2909,7 @@
           <a:p>
             <a:fld id="{A3AE657A-D284-404D-960B-6B1864A84D1B}" type="datetimeFigureOut">
               <a:rPr lang="en-US" smtClean="0"/>
-              <a:t>3/28/2022</a:t>
+              <a:t>4/7/2022</a:t>
             </a:fld>
             <a:endParaRPr lang="en-US"/>
           </a:p>
@@ -2920,7 +2920,7 @@
           <p:cNvPr id="5" name="Footer Placeholder 4">
             <a:extLst>
               <a:ext uri="{FF2B5EF4-FFF2-40B4-BE49-F238E27FC236}">
-                <a16:creationId xmlns:a16="http://schemas.microsoft.com/office/drawing/2014/main" xmlns="" id="{3B8AAE3E-84DF-43F6-902B-A5E732AF278A}"/>
+                <a16:creationId xmlns="" xmlns:a16="http://schemas.microsoft.com/office/drawing/2014/main" id="{3B8AAE3E-84DF-43F6-902B-A5E732AF278A}"/>
               </a:ext>
             </a:extLst>
           </p:cNvPr>
@@ -2963,7 +2963,7 @@
           <p:cNvPr id="6" name="Slide Number Placeholder 5">
             <a:extLst>
               <a:ext uri="{FF2B5EF4-FFF2-40B4-BE49-F238E27FC236}">
-                <a16:creationId xmlns:a16="http://schemas.microsoft.com/office/drawing/2014/main" xmlns="" id="{7579D16B-435A-46BA-B9D4-735DD6980E26}"/>
+                <a16:creationId xmlns="" xmlns:a16="http://schemas.microsoft.com/office/drawing/2014/main" id="{7579D16B-435A-46BA-B9D4-735DD6980E26}"/>
               </a:ext>
             </a:extLst>
           </p:cNvPr>
@@ -3331,7 +3331,7 @@
           <p:cNvPr id="65" name="Rounded Rectangle 60">
             <a:extLst>
               <a:ext uri="{FF2B5EF4-FFF2-40B4-BE49-F238E27FC236}">
-                <a16:creationId xmlns:a16="http://schemas.microsoft.com/office/drawing/2014/main" xmlns="" id="{237A6621-EDB6-4188-8573-7B8B8746FFD7}"/>
+                <a16:creationId xmlns="" xmlns:a16="http://schemas.microsoft.com/office/drawing/2014/main" id="{237A6621-EDB6-4188-8573-7B8B8746FFD7}"/>
               </a:ext>
             </a:extLst>
           </p:cNvPr>
@@ -3407,8 +3407,8 @@
         </p:nvSpPr>
         <p:spPr>
           <a:xfrm>
-            <a:off x="6961465" y="1532318"/>
-            <a:ext cx="2460363" cy="873926"/>
+            <a:off x="6818301" y="2737797"/>
+            <a:ext cx="1713698" cy="979235"/>
           </a:xfrm>
           <a:prstGeom prst="roundRect">
             <a:avLst>
@@ -3556,8 +3556,8 @@
         </p:nvSpPr>
         <p:spPr>
           <a:xfrm>
-            <a:off x="6866417" y="4061535"/>
-            <a:ext cx="2439630" cy="810581"/>
+            <a:off x="6818300" y="3817070"/>
+            <a:ext cx="1695857" cy="1052090"/>
           </a:xfrm>
           <a:prstGeom prst="roundRect">
             <a:avLst>
@@ -3615,95 +3615,13 @@
       </p:sp>
       <p:sp>
         <p:nvSpPr>
-          <p:cNvPr id="69" name="Rounded Rectangle 68"/>
-          <p:cNvSpPr/>
-          <p:nvPr/>
-        </p:nvSpPr>
-        <p:spPr>
-          <a:xfrm>
-            <a:off x="6892257" y="2844607"/>
-            <a:ext cx="2435650" cy="853748"/>
-          </a:xfrm>
-          <a:prstGeom prst="roundRect">
-            <a:avLst>
-              <a:gd name="adj" fmla="val 15733"/>
-            </a:avLst>
-          </a:prstGeom>
-          <a:solidFill>
-            <a:srgbClr val="FFFFFF"/>
-          </a:solidFill>
-          <a:ln w="12700" cap="flat" cmpd="sng" algn="ctr">
-            <a:solidFill>
-              <a:srgbClr val="CBD3D7"/>
-            </a:solidFill>
-            <a:prstDash val="solid"/>
-          </a:ln>
-          <a:effectLst/>
-        </p:spPr>
-        <p:txBody>
-          <a:bodyPr rtlCol="0" anchor="ctr"/>
-          <a:lstStyle/>
-          <a:p>
-            <a:pPr marL="0" marR="0" lvl="0" indent="0" algn="ctr" defTabSz="914377" eaLnBrk="1" fontAlgn="auto" latinLnBrk="0" hangingPunct="1">
-              <a:lnSpc>
-                <a:spcPct val="100000"/>
-              </a:lnSpc>
-              <a:spcBef>
-                <a:spcPts val="0"/>
-              </a:spcBef>
-              <a:spcAft>
-                <a:spcPts val="0"/>
-              </a:spcAft>
-              <a:buClrTx/>
-              <a:buSzTx/>
-              <a:buFontTx/>
-              <a:buNone/>
-              <a:tabLst/>
-              <a:defRPr/>
-            </a:pPr>
-            <a:r>
-              <a:rPr kumimoji="0" lang="en-US" sz="1800" b="0" i="0" u="none" strike="noStrike" kern="0" cap="none" spc="0" normalizeH="0" baseline="0" noProof="0" smtClean="0">
-                <a:ln>
-                  <a:noFill/>
-                </a:ln>
-                <a:solidFill>
-                  <a:srgbClr val="FFFFFF"/>
-                </a:solidFill>
-                <a:effectLst/>
-                <a:uLnTx/>
-                <a:uFillTx/>
-                <a:latin typeface="Calibri" panose="020F0502020204030204"/>
-                <a:ea typeface="+mn-ea"/>
-                <a:cs typeface="+mn-cs"/>
-              </a:rPr>
-              <a:t>vz</a:t>
-            </a:r>
-            <a:endParaRPr kumimoji="0" lang="en-US" sz="1800" b="0" i="0" u="none" strike="noStrike" kern="0" cap="none" spc="0" normalizeH="0" baseline="0" noProof="0" dirty="0" smtClean="0">
-              <a:ln>
-                <a:noFill/>
-              </a:ln>
-              <a:solidFill>
-                <a:srgbClr val="FFFFFF"/>
-              </a:solidFill>
-              <a:effectLst/>
-              <a:uLnTx/>
-              <a:uFillTx/>
-              <a:latin typeface="Calibri" panose="020F0502020204030204"/>
-              <a:ea typeface="+mn-ea"/>
-              <a:cs typeface="+mn-cs"/>
-            </a:endParaRPr>
-          </a:p>
-        </p:txBody>
-      </p:sp>
-      <p:sp>
-        <p:nvSpPr>
           <p:cNvPr id="70" name="TextBox 69"/>
           <p:cNvSpPr txBox="1"/>
           <p:nvPr/>
         </p:nvSpPr>
         <p:spPr>
           <a:xfrm>
-            <a:off x="6961465" y="1607973"/>
+            <a:off x="6818300" y="2813453"/>
             <a:ext cx="1931600" cy="307777"/>
           </a:xfrm>
           <a:prstGeom prst="rect">
@@ -3727,52 +3645,7 @@
                 <a:ea typeface="Source Sans Pro" charset="0"/>
                 <a:cs typeface="Source Sans Pro" charset="0"/>
               </a:rPr>
-              <a:t>Central Repository</a:t>
-            </a:r>
-            <a:endParaRPr lang="en-US" sz="1400" b="1" dirty="0">
-              <a:solidFill>
-                <a:srgbClr val="4B5357"/>
-              </a:solidFill>
-              <a:latin typeface="Source Sans Pro" charset="0"/>
-              <a:ea typeface="Source Sans Pro" charset="0"/>
-              <a:cs typeface="Source Sans Pro" charset="0"/>
-            </a:endParaRPr>
-          </a:p>
-        </p:txBody>
-      </p:sp>
-      <p:sp>
-        <p:nvSpPr>
-          <p:cNvPr id="71" name="TextBox 70"/>
-          <p:cNvSpPr txBox="1"/>
-          <p:nvPr/>
-        </p:nvSpPr>
-        <p:spPr>
-          <a:xfrm>
-            <a:off x="6934146" y="2952215"/>
-            <a:ext cx="1909130" cy="307777"/>
-          </a:xfrm>
-          <a:prstGeom prst="rect">
-            <a:avLst/>
-          </a:prstGeom>
-          <a:noFill/>
-        </p:spPr>
-        <p:txBody>
-          <a:bodyPr wrap="square" rtlCol="0">
-            <a:spAutoFit/>
-          </a:bodyPr>
-          <a:lstStyle/>
-          <a:p>
-            <a:pPr defTabSz="914377"/>
-            <a:r>
-              <a:rPr lang="en-US" sz="1400" b="1" dirty="0" smtClean="0">
-                <a:solidFill>
-                  <a:srgbClr val="4B5357"/>
-                </a:solidFill>
-                <a:latin typeface="Source Sans Pro" charset="0"/>
-                <a:ea typeface="Source Sans Pro" charset="0"/>
-                <a:cs typeface="Source Sans Pro" charset="0"/>
-              </a:rPr>
-              <a:t>Developer Repository</a:t>
+              <a:t>Module Repositories</a:t>
             </a:r>
             <a:endParaRPr lang="en-US" sz="1400" b="1" dirty="0">
               <a:solidFill>
@@ -3801,7 +3674,7 @@
         </p:blipFill>
         <p:spPr>
           <a:xfrm>
-            <a:off x="8821416" y="4152036"/>
+            <a:off x="7488098" y="4372670"/>
             <a:ext cx="356260" cy="356260"/>
           </a:xfrm>
           <a:prstGeom prst="rect">
@@ -3817,7 +3690,7 @@
         </p:nvSpPr>
         <p:spPr>
           <a:xfrm>
-            <a:off x="6891801" y="4176277"/>
+            <a:off x="6849785" y="3986584"/>
             <a:ext cx="1783362" cy="307777"/>
           </a:xfrm>
           <a:prstGeom prst="rect">
@@ -3841,7 +3714,7 @@
                 <a:ea typeface="Source Sans Pro" charset="0"/>
                 <a:cs typeface="Source Sans Pro" charset="0"/>
               </a:rPr>
-              <a:t>GitHub Repository</a:t>
+              <a:t>Source Repositories</a:t>
             </a:r>
             <a:endParaRPr lang="en-US" sz="1400" b="1" dirty="0">
               <a:solidFill>
@@ -4061,7 +3934,7 @@
           <p:cNvPr id="77" name="Picture 76">
             <a:extLst>
               <a:ext uri="{FF2B5EF4-FFF2-40B4-BE49-F238E27FC236}">
-                <a16:creationId xmlns="" xmlns:a16="http://schemas.microsoft.com/office/drawing/2014/main" id="{72176D6D-182A-4BB5-8EA3-0ACC3EEFD101}"/>
+                <a16:creationId xmlns:a16="http://schemas.microsoft.com/office/drawing/2014/main" xmlns="" id="{72176D6D-182A-4BB5-8EA3-0ACC3EEFD101}"/>
               </a:ext>
             </a:extLst>
           </p:cNvPr>
@@ -4084,8 +3957,8 @@
         </p:blipFill>
         <p:spPr>
           <a:xfrm>
-            <a:off x="1870331" y="3394355"/>
-            <a:ext cx="973103" cy="322677"/>
+            <a:off x="1782594" y="3615265"/>
+            <a:ext cx="1093687" cy="362662"/>
           </a:xfrm>
           <a:prstGeom prst="rect">
             <a:avLst/>
@@ -4124,7 +3997,18 @@
                 <a:ea typeface="Source Sans Pro" charset="0"/>
                 <a:cs typeface="Source Sans Pro" charset="0"/>
               </a:rPr>
-              <a:t>Module Manager</a:t>
+              <a:t>Module </a:t>
+            </a:r>
+            <a:r>
+              <a:rPr lang="en-US" sz="1400" b="1" dirty="0" smtClean="0">
+                <a:solidFill>
+                  <a:srgbClr val="4B5357"/>
+                </a:solidFill>
+                <a:latin typeface="Source Sans Pro" charset="0"/>
+                <a:ea typeface="Source Sans Pro" charset="0"/>
+                <a:cs typeface="Source Sans Pro" charset="0"/>
+              </a:rPr>
+              <a:t>Manager</a:t>
             </a:r>
             <a:endParaRPr lang="en-US" sz="1400" b="1" dirty="0">
               <a:solidFill>
@@ -4139,10 +4023,10 @@
       </p:sp>
       <p:pic>
         <p:nvPicPr>
-          <p:cNvPr id="79" name="Picture 78">
-            <a:extLst>
-              <a:ext uri="{FF2B5EF4-FFF2-40B4-BE49-F238E27FC236}">
-                <a16:creationId xmlns:a16="http://schemas.microsoft.com/office/drawing/2014/main" xmlns="" id="{6E47523C-39E3-414E-8E44-2AF044AA7D00}"/>
+          <p:cNvPr id="80" name="Picture 79">
+            <a:extLst>
+              <a:ext uri="{FF2B5EF4-FFF2-40B4-BE49-F238E27FC236}">
+                <a16:creationId xmlns="" xmlns:a16="http://schemas.microsoft.com/office/drawing/2014/main" id="{B9BC1CCF-31EE-4DC1-ABBF-BD10F1CF41F4}"/>
               </a:ext>
             </a:extLst>
           </p:cNvPr>
@@ -4153,42 +4037,6 @@
         </p:nvPicPr>
         <p:blipFill>
           <a:blip r:embed="rId4" cstate="print">
-            <a:extLst>
-              <a:ext uri="{28A0092B-C50C-407E-A947-70E740481C1C}">
-                <a14:useLocalDpi xmlns:a14="http://schemas.microsoft.com/office/drawing/2010/main" val="0"/>
-              </a:ext>
-            </a:extLst>
-          </a:blip>
-          <a:stretch>
-            <a:fillRect/>
-          </a:stretch>
-        </p:blipFill>
-        <p:spPr>
-          <a:xfrm>
-            <a:off x="5151274" y="3217828"/>
-            <a:ext cx="455462" cy="459117"/>
-          </a:xfrm>
-          <a:prstGeom prst="rect">
-            <a:avLst/>
-          </a:prstGeom>
-        </p:spPr>
-      </p:pic>
-      <p:pic>
-        <p:nvPicPr>
-          <p:cNvPr id="80" name="Picture 79">
-            <a:extLst>
-              <a:ext uri="{FF2B5EF4-FFF2-40B4-BE49-F238E27FC236}">
-                <a16:creationId xmlns:a16="http://schemas.microsoft.com/office/drawing/2014/main" xmlns="" id="{B9BC1CCF-31EE-4DC1-ABBF-BD10F1CF41F4}"/>
-              </a:ext>
-            </a:extLst>
-          </p:cNvPr>
-          <p:cNvPicPr>
-            <a:picLocks noChangeAspect="1"/>
-          </p:cNvPicPr>
-          <p:nvPr/>
-        </p:nvPicPr>
-        <p:blipFill>
-          <a:blip r:embed="rId5" cstate="print">
             <a:extLst>
               <a:ext uri="{28A0092B-C50C-407E-A947-70E740481C1C}">
                 <a14:useLocalDpi xmlns:a14="http://schemas.microsoft.com/office/drawing/2010/main" val="0"/>
@@ -4241,7 +4089,7 @@
                 <a:ea typeface="Source Sans Pro" charset="0"/>
                 <a:cs typeface="Source Sans Pro" charset="0"/>
               </a:rPr>
-              <a:t>SDK (Desktop)</a:t>
+              <a:t>IDE</a:t>
             </a:r>
             <a:endParaRPr lang="en-US" sz="1400" b="1" dirty="0">
               <a:solidFill>
@@ -4259,7 +4107,7 @@
           <p:cNvPr id="82" name="Picture 81">
             <a:extLst>
               <a:ext uri="{FF2B5EF4-FFF2-40B4-BE49-F238E27FC236}">
-                <a16:creationId xmlns:a16="http://schemas.microsoft.com/office/drawing/2014/main" xmlns="" id="{579DE3DA-C1FA-49CF-890F-DF5AEF9DE1DD}"/>
+                <a16:creationId xmlns="" xmlns:a16="http://schemas.microsoft.com/office/drawing/2014/main" id="{579DE3DA-C1FA-49CF-890F-DF5AEF9DE1DD}"/>
               </a:ext>
             </a:extLst>
           </p:cNvPr>
@@ -4269,7 +4117,7 @@
           <p:nvPr/>
         </p:nvPicPr>
         <p:blipFill rotWithShape="1">
-          <a:blip r:embed="rId6" cstate="print">
+          <a:blip r:embed="rId5" cstate="print">
             <a:extLst>
               <a:ext uri="{28A0092B-C50C-407E-A947-70E740481C1C}">
                 <a14:useLocalDpi xmlns:a14="http://schemas.microsoft.com/office/drawing/2010/main" val="0"/>
@@ -4298,7 +4146,7 @@
           <p:nvPr/>
         </p:nvPicPr>
         <p:blipFill>
-          <a:blip r:embed="rId7" cstate="print">
+          <a:blip r:embed="rId6" cstate="print">
             <a:extLst>
               <a:ext uri="{28A0092B-C50C-407E-A947-70E740481C1C}">
                 <a14:useLocalDpi xmlns:a14="http://schemas.microsoft.com/office/drawing/2010/main" val="0"/>
@@ -4311,68 +4159,8 @@
         </p:blipFill>
         <p:spPr>
           <a:xfrm>
-            <a:off x="8777601" y="1557258"/>
+            <a:off x="7412282" y="3146213"/>
             <a:ext cx="457283" cy="457283"/>
-          </a:xfrm>
-          <a:prstGeom prst="rect">
-            <a:avLst/>
-          </a:prstGeom>
-        </p:spPr>
-      </p:pic>
-      <p:pic>
-        <p:nvPicPr>
-          <p:cNvPr id="84" name="Picture 83"/>
-          <p:cNvPicPr>
-            <a:picLocks noChangeAspect="1"/>
-          </p:cNvPicPr>
-          <p:nvPr/>
-        </p:nvPicPr>
-        <p:blipFill>
-          <a:blip r:embed="rId7" cstate="print">
-            <a:extLst>
-              <a:ext uri="{28A0092B-C50C-407E-A947-70E740481C1C}">
-                <a14:useLocalDpi xmlns:a14="http://schemas.microsoft.com/office/drawing/2010/main" val="0"/>
-              </a:ext>
-            </a:extLst>
-          </a:blip>
-          <a:stretch>
-            <a:fillRect/>
-          </a:stretch>
-        </p:blipFill>
-        <p:spPr>
-          <a:xfrm>
-            <a:off x="8740209" y="2877818"/>
-            <a:ext cx="457283" cy="457283"/>
-          </a:xfrm>
-          <a:prstGeom prst="rect">
-            <a:avLst/>
-          </a:prstGeom>
-        </p:spPr>
-      </p:pic>
-      <p:pic>
-        <p:nvPicPr>
-          <p:cNvPr id="85" name="Picture 84"/>
-          <p:cNvPicPr>
-            <a:picLocks noChangeAspect="1"/>
-          </p:cNvPicPr>
-          <p:nvPr/>
-        </p:nvPicPr>
-        <p:blipFill>
-          <a:blip r:embed="rId8" cstate="print">
-            <a:extLst>
-              <a:ext uri="{28A0092B-C50C-407E-A947-70E740481C1C}">
-                <a14:useLocalDpi xmlns:a14="http://schemas.microsoft.com/office/drawing/2010/main" val="0"/>
-              </a:ext>
-            </a:extLst>
-          </a:blip>
-          <a:stretch>
-            <a:fillRect/>
-          </a:stretch>
-        </p:blipFill>
-        <p:spPr>
-          <a:xfrm>
-            <a:off x="4778270" y="3944278"/>
-            <a:ext cx="1206683" cy="657548"/>
           </a:xfrm>
           <a:prstGeom prst="rect">
             <a:avLst/>
@@ -4388,7 +4176,7 @@
           <p:nvPr/>
         </p:nvPicPr>
         <p:blipFill>
-          <a:blip r:embed="rId9"/>
+          <a:blip r:embed="rId7"/>
           <a:stretch>
             <a:fillRect/>
           </a:stretch>
@@ -4448,6 +4236,72 @@
           </a:p>
         </p:txBody>
       </p:sp>
+      <p:pic>
+        <p:nvPicPr>
+          <p:cNvPr id="85" name="Picture 84"/>
+          <p:cNvPicPr>
+            <a:picLocks noChangeAspect="1"/>
+          </p:cNvPicPr>
+          <p:nvPr/>
+        </p:nvPicPr>
+        <p:blipFill>
+          <a:blip r:embed="rId8" cstate="print">
+            <a:extLst>
+              <a:ext uri="{28A0092B-C50C-407E-A947-70E740481C1C}">
+                <a14:useLocalDpi xmlns:a14="http://schemas.microsoft.com/office/drawing/2010/main" val="0"/>
+              </a:ext>
+            </a:extLst>
+          </a:blip>
+          <a:stretch>
+            <a:fillRect/>
+          </a:stretch>
+        </p:blipFill>
+        <p:spPr>
+          <a:xfrm>
+            <a:off x="4243056" y="3335551"/>
+            <a:ext cx="2255279" cy="1228951"/>
+          </a:xfrm>
+          <a:prstGeom prst="rect">
+            <a:avLst/>
+          </a:prstGeom>
+        </p:spPr>
+      </p:pic>
+      <p:pic>
+        <p:nvPicPr>
+          <p:cNvPr id="79" name="Picture 78">
+            <a:extLst>
+              <a:ext uri="{FF2B5EF4-FFF2-40B4-BE49-F238E27FC236}">
+                <a16:creationId xmlns="" xmlns:a16="http://schemas.microsoft.com/office/drawing/2014/main" id="{6E47523C-39E3-414E-8E44-2AF044AA7D00}"/>
+              </a:ext>
+            </a:extLst>
+          </p:cNvPr>
+          <p:cNvPicPr>
+            <a:picLocks noChangeAspect="1"/>
+          </p:cNvPicPr>
+          <p:nvPr/>
+        </p:nvPicPr>
+        <p:blipFill>
+          <a:blip r:embed="rId9" cstate="print">
+            <a:extLst>
+              <a:ext uri="{28A0092B-C50C-407E-A947-70E740481C1C}">
+                <a14:useLocalDpi xmlns:a14="http://schemas.microsoft.com/office/drawing/2010/main" val="0"/>
+              </a:ext>
+            </a:extLst>
+          </a:blip>
+          <a:stretch>
+            <a:fillRect/>
+          </a:stretch>
+        </p:blipFill>
+        <p:spPr>
+          <a:xfrm>
+            <a:off x="5031475" y="3781473"/>
+            <a:ext cx="455462" cy="459117"/>
+          </a:xfrm>
+          <a:prstGeom prst="rect">
+            <a:avLst/>
+          </a:prstGeom>
+        </p:spPr>
+      </p:pic>
     </p:spTree>
     <p:extLst>
       <p:ext uri="{BB962C8B-B14F-4D97-AF65-F5344CB8AC3E}">

</xml_diff>